<commit_message>
State for the presentation
</commit_message>
<xml_diff>
--- a/Icon.pptx
+++ b/Icon.pptx
@@ -104,6 +104,11 @@
       </a:defRPr>
     </a:lvl9pPr>
   </p:defaultTextStyle>
+  <p:extLst>
+    <p:ext uri="{EFAFB233-063F-42B5-8137-9DF3F51BA10A}">
+      <p15:sldGuideLst xmlns:p15="http://schemas.microsoft.com/office/powerpoint/2012/main"/>
+    </p:ext>
+  </p:extLst>
 </p:presentation>
 </file>
 
@@ -3323,10 +3328,10 @@
       </p:grpSpPr>
       <p:grpSp>
         <p:nvGrpSpPr>
-          <p:cNvPr id="1102" name="Group 1101">
-            <a:extLst>
-              <a:ext uri="{FF2B5EF4-FFF2-40B4-BE49-F238E27FC236}">
-                <a16:creationId xmlns:a16="http://schemas.microsoft.com/office/drawing/2014/main" id="{7E2180C3-4A7D-4468-8176-5389DA5B3FCC}"/>
+          <p:cNvPr id="74" name="Group 73">
+            <a:extLst>
+              <a:ext uri="{FF2B5EF4-FFF2-40B4-BE49-F238E27FC236}">
+                <a16:creationId xmlns:a16="http://schemas.microsoft.com/office/drawing/2014/main" id="{D50D4DC3-4D77-4AB5-A394-7AC5446F1A70}"/>
               </a:ext>
             </a:extLst>
           </p:cNvPr>
@@ -3335,10 +3340,10 @@
         </p:nvGrpSpPr>
         <p:grpSpPr>
           <a:xfrm>
-            <a:off x="4335780" y="1650986"/>
-            <a:ext cx="3471097" cy="3594114"/>
+            <a:off x="4272280" y="1601463"/>
+            <a:ext cx="3471097" cy="3655074"/>
             <a:chOff x="4335780" y="1650986"/>
-            <a:chExt cx="3471097" cy="3594114"/>
+            <a:chExt cx="3471097" cy="3655074"/>
           </a:xfrm>
         </p:grpSpPr>
         <p:sp>
@@ -3410,13 +3415,13 @@
           </p:nvCxnSpPr>
           <p:spPr>
             <a:xfrm flipV="1">
-              <a:off x="4439845" y="1788085"/>
-              <a:ext cx="348130" cy="332890"/>
+              <a:off x="4491878" y="1840118"/>
+              <a:ext cx="305024" cy="289784"/>
             </a:xfrm>
             <a:prstGeom prst="line">
               <a:avLst/>
             </a:prstGeom>
-            <a:ln w="9525">
+            <a:ln w="19050">
               <a:solidFill>
                 <a:schemeClr val="accent6">
                   <a:lumMod val="60000"/>
@@ -3458,13 +3463,13 @@
           </p:nvCxnSpPr>
           <p:spPr>
             <a:xfrm>
-              <a:off x="4874185" y="1788085"/>
-              <a:ext cx="571725" cy="571725"/>
+              <a:off x="4926218" y="1840118"/>
+              <a:ext cx="528619" cy="528619"/>
             </a:xfrm>
             <a:prstGeom prst="line">
               <a:avLst/>
             </a:prstGeom>
-            <a:ln w="9525">
+            <a:ln w="19050">
               <a:gradFill>
                 <a:gsLst>
                   <a:gs pos="35000">
@@ -3510,13 +3515,13 @@
           </p:nvCxnSpPr>
           <p:spPr>
             <a:xfrm flipH="1" flipV="1">
-              <a:off x="5001612" y="2400300"/>
-              <a:ext cx="426443" cy="2615"/>
+              <a:off x="5062572" y="2430780"/>
+              <a:ext cx="365483" cy="2615"/>
             </a:xfrm>
             <a:prstGeom prst="line">
               <a:avLst/>
             </a:prstGeom>
-            <a:ln w="9525">
+            <a:ln w="19050">
               <a:solidFill>
                 <a:srgbClr val="71DD8D"/>
               </a:solidFill>
@@ -3554,13 +3559,13 @@
           </p:nvCxnSpPr>
           <p:spPr>
             <a:xfrm flipV="1">
-              <a:off x="5549975" y="2400300"/>
-              <a:ext cx="1606229" cy="2615"/>
+              <a:off x="5610935" y="2430780"/>
+              <a:ext cx="1545269" cy="2615"/>
             </a:xfrm>
             <a:prstGeom prst="line">
               <a:avLst/>
             </a:prstGeom>
-            <a:ln w="9525">
+            <a:ln w="19050">
               <a:solidFill>
                 <a:srgbClr val="59A19F"/>
               </a:solidFill>
@@ -3599,13 +3604,13 @@
           </p:nvCxnSpPr>
           <p:spPr>
             <a:xfrm>
-              <a:off x="4983757" y="2443405"/>
-              <a:ext cx="1046278" cy="1338730"/>
+              <a:off x="5035790" y="2495438"/>
+              <a:ext cx="1003172" cy="1295624"/>
             </a:xfrm>
             <a:prstGeom prst="line">
               <a:avLst/>
             </a:prstGeom>
-            <a:ln w="9525">
+            <a:ln w="19050">
               <a:gradFill>
                 <a:gsLst>
                   <a:gs pos="71000">
@@ -3651,13 +3656,13 @@
           </p:nvCxnSpPr>
           <p:spPr>
             <a:xfrm flipV="1">
-              <a:off x="6116245" y="2443405"/>
-              <a:ext cx="1057814" cy="1338730"/>
+              <a:off x="6168278" y="2495438"/>
+              <a:ext cx="1014708" cy="1295624"/>
             </a:xfrm>
             <a:prstGeom prst="line">
               <a:avLst/>
             </a:prstGeom>
-            <a:ln w="9525">
+            <a:ln w="19050">
               <a:gradFill>
                 <a:gsLst>
                   <a:gs pos="14000">
@@ -3704,13 +3709,13 @@
           </p:nvCxnSpPr>
           <p:spPr>
             <a:xfrm>
-              <a:off x="4897547" y="2357195"/>
+              <a:off x="4906474" y="2366122"/>
               <a:ext cx="672664" cy="485290"/>
             </a:xfrm>
             <a:prstGeom prst="line">
               <a:avLst/>
             </a:prstGeom>
-            <a:ln w="9525">
+            <a:ln w="19050">
               <a:gradFill>
                 <a:gsLst>
                   <a:gs pos="71000">
@@ -3761,7 +3766,7 @@
             <a:prstGeom prst="line">
               <a:avLst/>
             </a:prstGeom>
-            <a:ln w="9525">
+            <a:ln w="19050">
               <a:solidFill>
                 <a:srgbClr val="4A71BE"/>
               </a:solidFill>
@@ -3804,7 +3809,7 @@
             <a:prstGeom prst="line">
               <a:avLst/>
             </a:prstGeom>
-            <a:ln w="9525">
+            <a:ln w="19050">
               <a:solidFill>
                 <a:srgbClr val="4DBBB6"/>
               </a:solidFill>
@@ -3843,13 +3848,13 @@
           </p:nvCxnSpPr>
           <p:spPr>
             <a:xfrm flipV="1">
-              <a:off x="5674276" y="2719864"/>
-              <a:ext cx="681280" cy="165726"/>
+              <a:off x="5735236" y="2750344"/>
+              <a:ext cx="620320" cy="165726"/>
             </a:xfrm>
             <a:prstGeom prst="line">
               <a:avLst/>
             </a:prstGeom>
-            <a:ln w="9525">
+            <a:ln w="19050">
               <a:gradFill>
                 <a:gsLst>
                   <a:gs pos="0">
@@ -3896,12 +3901,12 @@
           <p:spPr>
             <a:xfrm flipV="1">
               <a:off x="6355556" y="2397910"/>
-              <a:ext cx="891611" cy="321954"/>
+              <a:ext cx="891611" cy="352434"/>
             </a:xfrm>
             <a:prstGeom prst="line">
               <a:avLst/>
             </a:prstGeom>
-            <a:ln w="9525">
+            <a:ln w="19050">
               <a:solidFill>
                 <a:srgbClr val="59A19F"/>
               </a:solidFill>
@@ -3940,13 +3945,13 @@
           </p:nvCxnSpPr>
           <p:spPr>
             <a:xfrm flipH="1">
-              <a:off x="6073140" y="3216434"/>
+              <a:off x="6103620" y="3216434"/>
               <a:ext cx="88827" cy="547846"/>
             </a:xfrm>
             <a:prstGeom prst="line">
               <a:avLst/>
             </a:prstGeom>
-            <a:ln w="9525">
+            <a:ln w="19050">
               <a:solidFill>
                 <a:srgbClr val="4D3C94"/>
               </a:solidFill>
@@ -3985,13 +3990,13 @@
           </p:nvCxnSpPr>
           <p:spPr>
             <a:xfrm flipV="1">
-              <a:off x="6205072" y="2443405"/>
-              <a:ext cx="968987" cy="790884"/>
+              <a:off x="6257105" y="2495438"/>
+              <a:ext cx="925881" cy="747778"/>
             </a:xfrm>
             <a:prstGeom prst="line">
               <a:avLst/>
             </a:prstGeom>
-            <a:ln w="9525">
+            <a:ln w="19050">
               <a:gradFill>
                 <a:gsLst>
                   <a:gs pos="18000">
@@ -4037,13 +4042,13 @@
           </p:nvCxnSpPr>
           <p:spPr>
             <a:xfrm>
-              <a:off x="6073140" y="3886200"/>
-              <a:ext cx="0" cy="1236980"/>
+              <a:off x="6103620" y="3947160"/>
+              <a:ext cx="0" cy="1176020"/>
             </a:xfrm>
             <a:prstGeom prst="line">
               <a:avLst/>
             </a:prstGeom>
-            <a:ln w="9525">
+            <a:ln w="19050">
               <a:gradFill>
                 <a:gsLst>
                   <a:gs pos="31000">
@@ -4089,13 +4094,13 @@
           </p:nvCxnSpPr>
           <p:spPr>
             <a:xfrm>
-              <a:off x="5532120" y="5184140"/>
-              <a:ext cx="480060" cy="0"/>
+              <a:off x="5593080" y="5214620"/>
+              <a:ext cx="419100" cy="0"/>
             </a:xfrm>
             <a:prstGeom prst="line">
               <a:avLst/>
             </a:prstGeom>
-            <a:ln w="9525">
+            <a:ln w="19050">
               <a:gradFill>
                 <a:gsLst>
                   <a:gs pos="22000">
@@ -4142,13 +4147,13 @@
           </p:nvCxnSpPr>
           <p:spPr>
             <a:xfrm>
-              <a:off x="6134100" y="5184140"/>
-              <a:ext cx="480060" cy="0"/>
+              <a:off x="6195060" y="5214620"/>
+              <a:ext cx="419100" cy="0"/>
             </a:xfrm>
             <a:prstGeom prst="line">
               <a:avLst/>
             </a:prstGeom>
-            <a:ln w="9525">
+            <a:ln w="19050">
               <a:gradFill>
                 <a:gsLst>
                   <a:gs pos="66000">
@@ -4195,13 +4200,13 @@
           </p:nvCxnSpPr>
           <p:spPr>
             <a:xfrm flipH="1">
-              <a:off x="6205072" y="2762969"/>
-              <a:ext cx="168339" cy="471320"/>
+              <a:off x="6257105" y="2815002"/>
+              <a:ext cx="125233" cy="428214"/>
             </a:xfrm>
             <a:prstGeom prst="line">
               <a:avLst/>
             </a:prstGeom>
-            <a:ln w="9525">
+            <a:ln w="19050">
               <a:gradFill>
                 <a:gsLst>
                   <a:gs pos="0">
@@ -4248,13 +4253,13 @@
           </p:nvCxnSpPr>
           <p:spPr>
             <a:xfrm>
-              <a:off x="5489015" y="2463875"/>
-              <a:ext cx="81196" cy="378610"/>
+              <a:off x="5519495" y="2524835"/>
+              <a:ext cx="59643" cy="326577"/>
             </a:xfrm>
             <a:prstGeom prst="line">
               <a:avLst/>
             </a:prstGeom>
-            <a:ln w="9525">
+            <a:ln w="19050">
               <a:gradFill>
                 <a:gsLst>
                   <a:gs pos="0">
@@ -4301,13 +4306,13 @@
           </p:nvCxnSpPr>
           <p:spPr>
             <a:xfrm>
-              <a:off x="5613316" y="2946550"/>
-              <a:ext cx="416719" cy="835585"/>
+              <a:off x="5643796" y="3007510"/>
+              <a:ext cx="395166" cy="783552"/>
             </a:xfrm>
             <a:prstGeom prst="line">
               <a:avLst/>
             </a:prstGeom>
-            <a:ln w="9525">
+            <a:ln w="19050">
               <a:gradFill>
                 <a:gsLst>
                   <a:gs pos="0">
@@ -4345,13 +4350,15 @@
                 </a:ext>
               </a:extLst>
             </p:cNvPr>
-            <p:cNvSpPr/>
+            <p:cNvSpPr>
+              <a:spLocks noChangeAspect="1"/>
+            </p:cNvSpPr>
             <p:nvPr/>
           </p:nvSpPr>
           <p:spPr>
             <a:xfrm>
               <a:off x="4879692" y="2339340"/>
-              <a:ext cx="121920" cy="121920"/>
+              <a:ext cx="182880" cy="182880"/>
             </a:xfrm>
             <a:prstGeom prst="ellipse">
               <a:avLst/>
@@ -4397,13 +4404,15 @@
                 </a:ext>
               </a:extLst>
             </p:cNvPr>
-            <p:cNvSpPr/>
+            <p:cNvSpPr>
+              <a:spLocks noChangeAspect="1"/>
+            </p:cNvSpPr>
             <p:nvPr/>
           </p:nvSpPr>
           <p:spPr>
             <a:xfrm>
               <a:off x="7156204" y="2339340"/>
-              <a:ext cx="121920" cy="121920"/>
+              <a:ext cx="182880" cy="182880"/>
             </a:xfrm>
             <a:prstGeom prst="ellipse">
               <a:avLst/>
@@ -4451,13 +4460,15 @@
                 </a:ext>
               </a:extLst>
             </p:cNvPr>
-            <p:cNvSpPr/>
+            <p:cNvSpPr>
+              <a:spLocks noChangeAspect="1"/>
+            </p:cNvSpPr>
             <p:nvPr/>
           </p:nvSpPr>
           <p:spPr>
             <a:xfrm>
               <a:off x="6012180" y="3764280"/>
-              <a:ext cx="121920" cy="121920"/>
+              <a:ext cx="182880" cy="182880"/>
             </a:xfrm>
             <a:prstGeom prst="ellipse">
               <a:avLst/>
@@ -4503,13 +4514,15 @@
                 </a:ext>
               </a:extLst>
             </p:cNvPr>
-            <p:cNvSpPr/>
+            <p:cNvSpPr>
+              <a:spLocks noChangeAspect="1"/>
+            </p:cNvSpPr>
             <p:nvPr/>
           </p:nvSpPr>
           <p:spPr>
             <a:xfrm>
               <a:off x="5552356" y="2824630"/>
-              <a:ext cx="121920" cy="121920"/>
+              <a:ext cx="182880" cy="182880"/>
             </a:xfrm>
             <a:prstGeom prst="ellipse">
               <a:avLst/>
@@ -4555,13 +4568,15 @@
                 </a:ext>
               </a:extLst>
             </p:cNvPr>
-            <p:cNvSpPr/>
+            <p:cNvSpPr>
+              <a:spLocks noChangeAspect="1"/>
+            </p:cNvSpPr>
             <p:nvPr/>
           </p:nvSpPr>
           <p:spPr>
             <a:xfrm>
               <a:off x="6355556" y="2658904"/>
-              <a:ext cx="121920" cy="121920"/>
+              <a:ext cx="182880" cy="182880"/>
             </a:xfrm>
             <a:prstGeom prst="ellipse">
               <a:avLst/>
@@ -4607,13 +4622,15 @@
                 </a:ext>
               </a:extLst>
             </p:cNvPr>
-            <p:cNvSpPr/>
+            <p:cNvSpPr>
+              <a:spLocks noChangeAspect="1"/>
+            </p:cNvSpPr>
             <p:nvPr/>
           </p:nvSpPr>
           <p:spPr>
             <a:xfrm>
               <a:off x="6101007" y="3216434"/>
-              <a:ext cx="121920" cy="121920"/>
+              <a:ext cx="182880" cy="182880"/>
             </a:xfrm>
             <a:prstGeom prst="ellipse">
               <a:avLst/>
@@ -4659,13 +4676,15 @@
                 </a:ext>
               </a:extLst>
             </p:cNvPr>
-            <p:cNvSpPr/>
+            <p:cNvSpPr>
+              <a:spLocks noChangeAspect="1"/>
+            </p:cNvSpPr>
             <p:nvPr/>
           </p:nvSpPr>
           <p:spPr>
             <a:xfrm>
               <a:off x="5428055" y="2341955"/>
-              <a:ext cx="121920" cy="121920"/>
+              <a:ext cx="182880" cy="182880"/>
             </a:xfrm>
             <a:prstGeom prst="ellipse">
               <a:avLst/>
@@ -4711,13 +4730,15 @@
                 </a:ext>
               </a:extLst>
             </p:cNvPr>
-            <p:cNvSpPr/>
+            <p:cNvSpPr>
+              <a:spLocks noChangeAspect="1"/>
+            </p:cNvSpPr>
             <p:nvPr/>
           </p:nvSpPr>
           <p:spPr>
             <a:xfrm>
               <a:off x="4770120" y="1684020"/>
-              <a:ext cx="121920" cy="121920"/>
+              <a:ext cx="182880" cy="182880"/>
             </a:xfrm>
             <a:prstGeom prst="ellipse">
               <a:avLst/>
@@ -4766,13 +4787,15 @@
                 </a:ext>
               </a:extLst>
             </p:cNvPr>
-            <p:cNvSpPr/>
+            <p:cNvSpPr>
+              <a:spLocks noChangeAspect="1"/>
+            </p:cNvSpPr>
             <p:nvPr/>
           </p:nvSpPr>
           <p:spPr>
             <a:xfrm>
               <a:off x="4335780" y="2103120"/>
-              <a:ext cx="121920" cy="121920"/>
+              <a:ext cx="182880" cy="182880"/>
             </a:xfrm>
             <a:prstGeom prst="ellipse">
               <a:avLst/>
@@ -4821,13 +4844,15 @@
                 </a:ext>
               </a:extLst>
             </p:cNvPr>
-            <p:cNvSpPr/>
+            <p:cNvSpPr>
+              <a:spLocks noChangeAspect="1"/>
+            </p:cNvSpPr>
             <p:nvPr/>
           </p:nvSpPr>
           <p:spPr>
             <a:xfrm>
               <a:off x="6012180" y="5123180"/>
-              <a:ext cx="121920" cy="121920"/>
+              <a:ext cx="182880" cy="182880"/>
             </a:xfrm>
             <a:prstGeom prst="ellipse">
               <a:avLst/>
@@ -4873,13 +4898,15 @@
                 </a:ext>
               </a:extLst>
             </p:cNvPr>
-            <p:cNvSpPr/>
+            <p:cNvSpPr>
+              <a:spLocks noChangeAspect="1"/>
+            </p:cNvSpPr>
             <p:nvPr/>
           </p:nvSpPr>
           <p:spPr>
             <a:xfrm>
               <a:off x="6614160" y="5123180"/>
-              <a:ext cx="121920" cy="121920"/>
+              <a:ext cx="182880" cy="182880"/>
             </a:xfrm>
             <a:prstGeom prst="ellipse">
               <a:avLst/>
@@ -4925,13 +4952,15 @@
                 </a:ext>
               </a:extLst>
             </p:cNvPr>
-            <p:cNvSpPr/>
+            <p:cNvSpPr>
+              <a:spLocks noChangeAspect="1"/>
+            </p:cNvSpPr>
             <p:nvPr/>
           </p:nvSpPr>
           <p:spPr>
             <a:xfrm>
               <a:off x="5410200" y="5123180"/>
-              <a:ext cx="121920" cy="121920"/>
+              <a:ext cx="182880" cy="182880"/>
             </a:xfrm>
             <a:prstGeom prst="ellipse">
               <a:avLst/>
@@ -4977,13 +5006,15 @@
                 </a:ext>
               </a:extLst>
             </p:cNvPr>
-            <p:cNvSpPr/>
+            <p:cNvSpPr>
+              <a:spLocks noChangeAspect="1"/>
+            </p:cNvSpPr>
             <p:nvPr/>
           </p:nvSpPr>
           <p:spPr>
             <a:xfrm>
-              <a:off x="6012180" y="4948562"/>
-              <a:ext cx="121920" cy="121920"/>
+              <a:off x="6012180" y="4894580"/>
+              <a:ext cx="182880" cy="182880"/>
             </a:xfrm>
             <a:prstGeom prst="ellipse">
               <a:avLst/>
@@ -5037,13 +5068,13 @@
           </p:nvCxnSpPr>
           <p:spPr>
             <a:xfrm flipH="1">
-              <a:off x="5514265" y="5009522"/>
-              <a:ext cx="497915" cy="131513"/>
+              <a:off x="5566298" y="4986020"/>
+              <a:ext cx="445882" cy="163942"/>
             </a:xfrm>
             <a:prstGeom prst="line">
               <a:avLst/>
             </a:prstGeom>
-            <a:ln w="9525">
+            <a:ln w="19050">
               <a:gradFill>
                 <a:gsLst>
                   <a:gs pos="37000">
@@ -5090,13 +5121,13 @@
           </p:nvCxnSpPr>
           <p:spPr>
             <a:xfrm>
-              <a:off x="6134100" y="5009522"/>
-              <a:ext cx="497915" cy="131513"/>
+              <a:off x="6195060" y="4986020"/>
+              <a:ext cx="445882" cy="163942"/>
             </a:xfrm>
             <a:prstGeom prst="line">
               <a:avLst/>
             </a:prstGeom>
-            <a:ln w="9525">
+            <a:ln w="19050">
               <a:gradFill>
                 <a:gsLst>
                   <a:gs pos="31000">

</xml_diff>